<commit_message>
Updated presentation with assumes and some other info, together with items in example test file
</commit_message>
<xml_diff>
--- a/JUnitU.pptx
+++ b/JUnitU.pptx
@@ -17,8 +17,11 @@
     <p:sldId id="279" r:id="rId11"/>
     <p:sldId id="261" r:id="rId12"/>
     <p:sldId id="280" r:id="rId13"/>
-    <p:sldId id="264" r:id="rId14"/>
-    <p:sldId id="272" r:id="rId15"/>
+    <p:sldId id="281" r:id="rId14"/>
+    <p:sldId id="282" r:id="rId15"/>
+    <p:sldId id="283" r:id="rId16"/>
+    <p:sldId id="264" r:id="rId17"/>
+    <p:sldId id="272" r:id="rId18"/>
   </p:sldIdLst>
   <p:sldSz cx="9144000" cy="6858000" type="screen4x3"/>
   <p:notesSz cx="6858000" cy="9144000"/>
@@ -3099,15 +3102,7 @@
             </a:pPr>
             <a:r>
               <a:rPr lang="en-US" dirty="0" smtClean="0"/>
-              <a:t>Asserts are checks to for expected behavior</a:t>
-            </a:r>
-            <a:r>
-              <a:rPr lang="en-US" dirty="0" smtClean="0"/>
-              <a:t>/environment. If Failed, will stop the test</a:t>
-            </a:r>
-            <a:r>
-              <a:rPr lang="en-US" dirty="0" smtClean="0"/>
-              <a:t> </a:t>
+              <a:t>Asserts are checks to for expected behavior/environment. If Failed, will stop the test </a:t>
             </a:r>
           </a:p>
           <a:p>
@@ -3339,6 +3334,322 @@
       </p:grpSpPr>
       <p:sp>
         <p:nvSpPr>
+          <p:cNvPr id="2" name="Title 1"/>
+          <p:cNvSpPr>
+            <a:spLocks noGrp="1"/>
+          </p:cNvSpPr>
+          <p:nvPr>
+            <p:ph type="title"/>
+          </p:nvPr>
+        </p:nvSpPr>
+        <p:spPr/>
+        <p:txBody>
+          <a:bodyPr/>
+          <a:lstStyle/>
+          <a:p>
+            <a:r>
+              <a:rPr lang="en-US" dirty="0" smtClean="0"/>
+              <a:t>Assume</a:t>
+            </a:r>
+            <a:endParaRPr lang="en-US" dirty="0"/>
+          </a:p>
+        </p:txBody>
+      </p:sp>
+      <p:sp>
+        <p:nvSpPr>
+          <p:cNvPr id="3" name="Content Placeholder 2"/>
+          <p:cNvSpPr>
+            <a:spLocks noGrp="1"/>
+          </p:cNvSpPr>
+          <p:nvPr>
+            <p:ph idx="1"/>
+          </p:nvPr>
+        </p:nvSpPr>
+        <p:spPr/>
+        <p:txBody>
+          <a:bodyPr/>
+          <a:lstStyle/>
+          <a:p>
+            <a:r>
+              <a:rPr lang="en-US" dirty="0" smtClean="0"/>
+              <a:t>Behaves similarly to Assert, but is meant to check if the conditions for the test are usable. </a:t>
+            </a:r>
+          </a:p>
+          <a:p>
+            <a:r>
+              <a:rPr lang="en-US" dirty="0" smtClean="0"/>
+              <a:t>Will skip the test if an assume has been incorrect. </a:t>
+            </a:r>
+          </a:p>
+          <a:p>
+            <a:r>
+              <a:rPr lang="en-US" dirty="0" smtClean="0"/>
+              <a:t>Useful for configuration checks. </a:t>
+            </a:r>
+            <a:endParaRPr lang="en-US" dirty="0"/>
+          </a:p>
+        </p:txBody>
+      </p:sp>
+    </p:spTree>
+    <p:extLst>
+      <p:ext uri="{BB962C8B-B14F-4D97-AF65-F5344CB8AC3E}">
+        <p14:creationId xmlns:p14="http://schemas.microsoft.com/office/powerpoint/2010/main" val="1511325507"/>
+      </p:ext>
+    </p:extLst>
+  </p:cSld>
+  <p:clrMapOvr>
+    <a:masterClrMapping/>
+  </p:clrMapOvr>
+</p:sld>
+</file>
+
+<file path=ppt/slides/slide14.xml><?xml version="1.0" encoding="utf-8"?>
+<p:sld xmlns:a="http://schemas.openxmlformats.org/drawingml/2006/main" xmlns:r="http://schemas.openxmlformats.org/officeDocument/2006/relationships" xmlns:p="http://schemas.openxmlformats.org/presentationml/2006/main">
+  <p:cSld>
+    <p:spTree>
+      <p:nvGrpSpPr>
+        <p:cNvPr id="1" name=""/>
+        <p:cNvGrpSpPr/>
+        <p:nvPr/>
+      </p:nvGrpSpPr>
+      <p:grpSpPr>
+        <a:xfrm>
+          <a:off x="0" y="0"/>
+          <a:ext cx="0" cy="0"/>
+          <a:chOff x="0" y="0"/>
+          <a:chExt cx="0" cy="0"/>
+        </a:xfrm>
+      </p:grpSpPr>
+      <p:sp>
+        <p:nvSpPr>
+          <p:cNvPr id="2" name="Title 1"/>
+          <p:cNvSpPr>
+            <a:spLocks noGrp="1"/>
+          </p:cNvSpPr>
+          <p:nvPr>
+            <p:ph type="title"/>
+          </p:nvPr>
+        </p:nvSpPr>
+        <p:spPr/>
+        <p:txBody>
+          <a:bodyPr/>
+          <a:lstStyle/>
+          <a:p>
+            <a:r>
+              <a:rPr lang="en-US" dirty="0" smtClean="0"/>
+              <a:t>Annotations</a:t>
+            </a:r>
+            <a:endParaRPr lang="en-US" dirty="0"/>
+          </a:p>
+        </p:txBody>
+      </p:sp>
+      <p:sp>
+        <p:nvSpPr>
+          <p:cNvPr id="3" name="Content Placeholder 2"/>
+          <p:cNvSpPr>
+            <a:spLocks noGrp="1"/>
+          </p:cNvSpPr>
+          <p:nvPr>
+            <p:ph idx="1"/>
+          </p:nvPr>
+        </p:nvSpPr>
+        <p:spPr>
+          <a:xfrm>
+            <a:off x="359612" y="1825625"/>
+            <a:ext cx="7393470" cy="4626690"/>
+          </a:xfrm>
+        </p:spPr>
+        <p:txBody>
+          <a:bodyPr>
+            <a:normAutofit/>
+          </a:bodyPr>
+          <a:lstStyle/>
+          <a:p>
+            <a:r>
+              <a:rPr lang="en-US" dirty="0" smtClean="0"/>
+              <a:t>@Test -&gt; notes the public functions that are to be executed as tests</a:t>
+            </a:r>
+          </a:p>
+          <a:p>
+            <a:r>
+              <a:rPr lang="en-US" dirty="0" smtClean="0"/>
+              <a:t>@Before -&gt; notes functions that have to run before </a:t>
+            </a:r>
+            <a:r>
+              <a:rPr lang="en-US" i="1" u="sng" dirty="0" smtClean="0"/>
+              <a:t>each</a:t>
+            </a:r>
+            <a:r>
+              <a:rPr lang="en-US" dirty="0" smtClean="0"/>
+              <a:t> test</a:t>
+            </a:r>
+          </a:p>
+          <a:p>
+            <a:r>
+              <a:rPr lang="en-US" dirty="0" smtClean="0"/>
+              <a:t>@</a:t>
+            </a:r>
+            <a:r>
+              <a:rPr lang="en-US" dirty="0" err="1" smtClean="0"/>
+              <a:t>BeforeClass</a:t>
+            </a:r>
+            <a:r>
+              <a:rPr lang="en-US" dirty="0" smtClean="0"/>
+              <a:t> -&gt; notes functions that will be run before the test suit is run</a:t>
+            </a:r>
+          </a:p>
+          <a:p>
+            <a:r>
+              <a:rPr lang="en-US" dirty="0" smtClean="0"/>
+              <a:t>@After -&gt; notes functions that will be run after </a:t>
+            </a:r>
+            <a:r>
+              <a:rPr lang="en-US" i="1" u="sng" dirty="0" smtClean="0"/>
+              <a:t>each</a:t>
+            </a:r>
+            <a:r>
+              <a:rPr lang="en-US" dirty="0" smtClean="0"/>
+              <a:t> test </a:t>
+            </a:r>
+          </a:p>
+          <a:p>
+            <a:r>
+              <a:rPr lang="en-US" dirty="0" smtClean="0"/>
+              <a:t>@</a:t>
+            </a:r>
+            <a:r>
+              <a:rPr lang="en-US" dirty="0" err="1" smtClean="0"/>
+              <a:t>AfterClass</a:t>
+            </a:r>
+            <a:r>
+              <a:rPr lang="en-US" dirty="0" smtClean="0"/>
+              <a:t> -&gt; notes function that will be run after the whole test suit</a:t>
+            </a:r>
+            <a:endParaRPr lang="en-US" dirty="0"/>
+          </a:p>
+        </p:txBody>
+      </p:sp>
+    </p:spTree>
+    <p:extLst>
+      <p:ext uri="{BB962C8B-B14F-4D97-AF65-F5344CB8AC3E}">
+        <p14:creationId xmlns:p14="http://schemas.microsoft.com/office/powerpoint/2010/main" val="415536791"/>
+      </p:ext>
+    </p:extLst>
+  </p:cSld>
+  <p:clrMapOvr>
+    <a:masterClrMapping/>
+  </p:clrMapOvr>
+</p:sld>
+</file>
+
+<file path=ppt/slides/slide15.xml><?xml version="1.0" encoding="utf-8"?>
+<p:sld xmlns:a="http://schemas.openxmlformats.org/drawingml/2006/main" xmlns:r="http://schemas.openxmlformats.org/officeDocument/2006/relationships" xmlns:p="http://schemas.openxmlformats.org/presentationml/2006/main">
+  <p:cSld>
+    <p:spTree>
+      <p:nvGrpSpPr>
+        <p:cNvPr id="1" name=""/>
+        <p:cNvGrpSpPr/>
+        <p:nvPr/>
+      </p:nvGrpSpPr>
+      <p:grpSpPr>
+        <a:xfrm>
+          <a:off x="0" y="0"/>
+          <a:ext cx="0" cy="0"/>
+          <a:chOff x="0" y="0"/>
+          <a:chExt cx="0" cy="0"/>
+        </a:xfrm>
+      </p:grpSpPr>
+      <p:sp>
+        <p:nvSpPr>
+          <p:cNvPr id="2" name="Title 1"/>
+          <p:cNvSpPr>
+            <a:spLocks noGrp="1"/>
+          </p:cNvSpPr>
+          <p:nvPr>
+            <p:ph type="title"/>
+          </p:nvPr>
+        </p:nvSpPr>
+        <p:spPr/>
+        <p:txBody>
+          <a:bodyPr/>
+          <a:lstStyle/>
+          <a:p>
+            <a:r>
+              <a:rPr lang="en-US" dirty="0" smtClean="0"/>
+              <a:t>Annotations</a:t>
+            </a:r>
+            <a:endParaRPr lang="en-US" dirty="0"/>
+          </a:p>
+        </p:txBody>
+      </p:sp>
+      <p:sp>
+        <p:nvSpPr>
+          <p:cNvPr id="3" name="Content Placeholder 2"/>
+          <p:cNvSpPr>
+            <a:spLocks noGrp="1"/>
+          </p:cNvSpPr>
+          <p:nvPr>
+            <p:ph idx="1"/>
+          </p:nvPr>
+        </p:nvSpPr>
+        <p:spPr/>
+        <p:txBody>
+          <a:bodyPr/>
+          <a:lstStyle/>
+          <a:p>
+            <a:r>
+              <a:rPr lang="en-US" dirty="0" smtClean="0"/>
+              <a:t>There is no set order in which the functions are run that are noted to run within the same step (@Before functions sequence can be random)</a:t>
+            </a:r>
+          </a:p>
+          <a:p>
+            <a:endParaRPr lang="en-US" dirty="0"/>
+          </a:p>
+          <a:p>
+            <a:r>
+              <a:rPr lang="en-US" dirty="0" smtClean="0"/>
+              <a:t>If you need sequences – use </a:t>
+            </a:r>
+            <a:r>
+              <a:rPr lang="en-US" smtClean="0"/>
+              <a:t>helper functions</a:t>
+            </a:r>
+            <a:endParaRPr lang="en-US"/>
+          </a:p>
+        </p:txBody>
+      </p:sp>
+    </p:spTree>
+    <p:extLst>
+      <p:ext uri="{BB962C8B-B14F-4D97-AF65-F5344CB8AC3E}">
+        <p14:creationId xmlns:p14="http://schemas.microsoft.com/office/powerpoint/2010/main" val="3321872658"/>
+      </p:ext>
+    </p:extLst>
+  </p:cSld>
+  <p:clrMapOvr>
+    <a:masterClrMapping/>
+  </p:clrMapOvr>
+</p:sld>
+</file>
+
+<file path=ppt/slides/slide16.xml><?xml version="1.0" encoding="utf-8"?>
+<p:sld xmlns:a="http://schemas.openxmlformats.org/drawingml/2006/main" xmlns:r="http://schemas.openxmlformats.org/officeDocument/2006/relationships" xmlns:p="http://schemas.openxmlformats.org/presentationml/2006/main">
+  <p:cSld>
+    <p:spTree>
+      <p:nvGrpSpPr>
+        <p:cNvPr id="1" name=""/>
+        <p:cNvGrpSpPr/>
+        <p:nvPr/>
+      </p:nvGrpSpPr>
+      <p:grpSpPr>
+        <a:xfrm>
+          <a:off x="0" y="0"/>
+          <a:ext cx="0" cy="0"/>
+          <a:chOff x="0" y="0"/>
+          <a:chExt cx="0" cy="0"/>
+        </a:xfrm>
+      </p:grpSpPr>
+      <p:sp>
+        <p:nvSpPr>
           <p:cNvPr id="3" name="Title 2"/>
           <p:cNvSpPr>
             <a:spLocks noGrp="1"/>
@@ -3399,7 +3710,7 @@
 </p:sld>
 </file>
 
-<file path=ppt/slides/slide14.xml><?xml version="1.0" encoding="utf-8"?>
+<file path=ppt/slides/slide17.xml><?xml version="1.0" encoding="utf-8"?>
 <p:sld xmlns:a="http://schemas.openxmlformats.org/drawingml/2006/main" xmlns:r="http://schemas.openxmlformats.org/officeDocument/2006/relationships" xmlns:p="http://schemas.openxmlformats.org/presentationml/2006/main">
   <p:cSld>
     <p:spTree>
@@ -3731,11 +4042,7 @@
             </a:pPr>
             <a:r>
               <a:rPr lang="en-US" dirty="0" smtClean="0"/>
-              <a:t>Mock – a simulated class or element, that is needed for the tested functionality to </a:t>
-            </a:r>
-            <a:r>
-              <a:rPr lang="en-US" dirty="0" smtClean="0"/>
-              <a:t>run</a:t>
+              <a:t>Mock – a simulated class or element, that is needed for the tested functionality to run</a:t>
             </a:r>
           </a:p>
           <a:p>
@@ -3747,7 +4054,6 @@
               <a:rPr lang="en-US" dirty="0" smtClean="0"/>
               <a:t>Test fixture – the fixed values that the code is tested against.</a:t>
             </a:r>
-            <a:endParaRPr lang="en-US" dirty="0" smtClean="0"/>
           </a:p>
           <a:p>
             <a:pPr marL="457200" indent="-457200">
@@ -3951,11 +4257,7 @@
           <a:p>
             <a:r>
               <a:rPr lang="en-US" dirty="0" smtClean="0"/>
-              <a:t>Store results in logs, not just system output</a:t>
-            </a:r>
-            <a:r>
-              <a:rPr lang="en-US" dirty="0" smtClean="0"/>
-              <a:t>!</a:t>
+              <a:t>Store results in logs, not just system output!</a:t>
             </a:r>
           </a:p>
           <a:p>
@@ -3966,7 +4268,6 @@
               <a:rPr lang="en-US" dirty="0"/>
               <a:t>Unit tests are not suitable for testing complex user interface or component interaction. For this, you should develop integration tests.</a:t>
             </a:r>
-            <a:endParaRPr lang="en-US" dirty="0"/>
           </a:p>
         </p:txBody>
       </p:sp>
@@ -4124,7 +4425,6 @@
               <a:rPr lang="en-US" dirty="0"/>
               <a:t>As a general rule, a test name should explain what the test does. If that is done correctly, reading the actual implementation can be avoided.</a:t>
             </a:r>
-            <a:endParaRPr lang="en-US" dirty="0"/>
           </a:p>
         </p:txBody>
       </p:sp>

</xml_diff>